<commit_message>
Updated group names, pictures of Q&A and Thank you
</commit_message>
<xml_diff>
--- a/Technical Analysis-comparison.pptx
+++ b/Technical Analysis-comparison.pptx
@@ -616,15 +616,7 @@
           <a:bodyPr/>
           <a:lstStyle/>
           <a:p>
-            <a:r>
-              <a:rPr lang="en-US" dirty="0"/>
-              <a:t>Reference:</a:t>
-            </a:r>
-            <a:r>
-              <a:rPr lang="en-US" baseline="0" dirty="0"/>
-              <a:t> CFA Investments Chapter 12</a:t>
-            </a:r>
-            <a:endParaRPr lang="en-US" dirty="0"/>
+            <a:endParaRPr lang="en-CA" dirty="0"/>
           </a:p>
         </p:txBody>
       </p:sp>
@@ -645,7 +637,7 @@
           <a:p>
             <a:fld id="{E10A885E-95FB-48AA-A3B2-ABB309CE7A18}" type="slidenum">
               <a:rPr lang="en-US" smtClean="0"/>
-              <a:t>6</a:t>
+              <a:t>4</a:t>
             </a:fld>
             <a:endParaRPr lang="en-US" dirty="0"/>
           </a:p>
@@ -654,7 +646,7 @@
     </p:spTree>
     <p:extLst>
       <p:ext uri="{BB962C8B-B14F-4D97-AF65-F5344CB8AC3E}">
-        <p14:creationId xmlns:p14="http://schemas.microsoft.com/office/powerpoint/2010/main" val="215704038"/>
+        <p14:creationId xmlns:p14="http://schemas.microsoft.com/office/powerpoint/2010/main" val="691384047"/>
       </p:ext>
     </p:extLst>
   </p:cSld>
@@ -708,7 +700,30 @@
           <a:bodyPr/>
           <a:lstStyle/>
           <a:p>
-            <a:endParaRPr lang="en-US" dirty="0"/>
+            <a:r>
+              <a:rPr lang="en-CA" sz="1200" b="0" i="0" kern="1200" dirty="0" smtClean="0">
+                <a:solidFill>
+                  <a:schemeClr val="tx1"/>
+                </a:solidFill>
+                <a:effectLst/>
+                <a:latin typeface="+mn-lt"/>
+                <a:ea typeface="+mn-ea"/>
+                <a:cs typeface="+mn-cs"/>
+              </a:rPr>
+              <a:t>Indicators are used in two main ways: to confirm price movement and the quality of chart patterns, and to form buy and sell signals. </a:t>
+            </a:r>
+            <a:br>
+              <a:rPr lang="en-CA" sz="1200" b="0" i="0" kern="1200" dirty="0" smtClean="0">
+                <a:solidFill>
+                  <a:schemeClr val="tx1"/>
+                </a:solidFill>
+                <a:effectLst/>
+                <a:latin typeface="+mn-lt"/>
+                <a:ea typeface="+mn-ea"/>
+                <a:cs typeface="+mn-cs"/>
+              </a:rPr>
+            </a:br>
+            <a:endParaRPr lang="en-CA" dirty="0"/>
           </a:p>
         </p:txBody>
       </p:sp>
@@ -728,8 +743,8 @@
           <a:lstStyle/>
           <a:p>
             <a:fld id="{E10A885E-95FB-48AA-A3B2-ABB309CE7A18}" type="slidenum">
-              <a:rPr lang="en-US"/>
-              <a:t>8</a:t>
+              <a:rPr lang="en-US" smtClean="0"/>
+              <a:t>5</a:t>
             </a:fld>
             <a:endParaRPr lang="en-US" dirty="0"/>
           </a:p>
@@ -738,7 +753,7 @@
     </p:spTree>
     <p:extLst>
       <p:ext uri="{BB962C8B-B14F-4D97-AF65-F5344CB8AC3E}">
-        <p14:creationId xmlns:p14="http://schemas.microsoft.com/office/powerpoint/2010/main" val="4004456771"/>
+        <p14:creationId xmlns:p14="http://schemas.microsoft.com/office/powerpoint/2010/main" val="547312416"/>
       </p:ext>
     </p:extLst>
   </p:cSld>
@@ -792,7 +807,27 @@
           <a:bodyPr/>
           <a:lstStyle/>
           <a:p>
-            <a:endParaRPr lang="en-US" dirty="0"/>
+            <a:r>
+              <a:rPr lang="en-US" dirty="0"/>
+              <a:t>Reference:</a:t>
+            </a:r>
+            <a:r>
+              <a:rPr lang="en-US" baseline="0" dirty="0"/>
+              <a:t> CFA Investments Chapter </a:t>
+            </a:r>
+            <a:r>
+              <a:rPr lang="en-US" baseline="0" dirty="0" smtClean="0"/>
+              <a:t>12</a:t>
+            </a:r>
+          </a:p>
+          <a:p>
+            <a:r>
+              <a:rPr lang="en-CA" dirty="0" smtClean="0"/>
+              <a:t>Oscillator indicators have a range, for example between zero and 100, and signal periods where the security is overbought (near 100) or oversold (near zero).</a:t>
+            </a:r>
+          </a:p>
+          <a:p>
+            <a:endParaRPr lang="en-CA" dirty="0" smtClean="0"/>
           </a:p>
         </p:txBody>
       </p:sp>
@@ -812,8 +847,8 @@
           <a:lstStyle/>
           <a:p>
             <a:fld id="{E10A885E-95FB-48AA-A3B2-ABB309CE7A18}" type="slidenum">
-              <a:rPr lang="en-US"/>
-              <a:t>9</a:t>
+              <a:rPr lang="en-US" smtClean="0"/>
+              <a:t>6</a:t>
             </a:fld>
             <a:endParaRPr lang="en-US" dirty="0"/>
           </a:p>
@@ -822,7 +857,7 @@
     </p:spTree>
     <p:extLst>
       <p:ext uri="{BB962C8B-B14F-4D97-AF65-F5344CB8AC3E}">
-        <p14:creationId xmlns:p14="http://schemas.microsoft.com/office/powerpoint/2010/main" val="309706012"/>
+        <p14:creationId xmlns:p14="http://schemas.microsoft.com/office/powerpoint/2010/main" val="215704038"/>
       </p:ext>
     </p:extLst>
   </p:cSld>
@@ -851,7 +886,7 @@
       </p:grpSpPr>
       <p:sp>
         <p:nvSpPr>
-          <p:cNvPr id="2" name="幻灯片图像占位符 1"/>
+          <p:cNvPr id="2" name="Slide Image Placeholder 1"/>
           <p:cNvSpPr>
             <a:spLocks noGrp="1" noRot="1" noChangeAspect="1"/>
           </p:cNvSpPr>
@@ -863,7 +898,7 @@
       </p:sp>
       <p:sp>
         <p:nvSpPr>
-          <p:cNvPr id="3" name="备注占位符 2"/>
+          <p:cNvPr id="3" name="Notes Placeholder 2"/>
           <p:cNvSpPr>
             <a:spLocks noGrp="1"/>
           </p:cNvSpPr>
@@ -876,13 +911,13 @@
           <a:bodyPr/>
           <a:lstStyle/>
           <a:p>
-            <a:endParaRPr kumimoji="1" lang="zh-CN" altLang="en-US" dirty="0"/>
-          </a:p>
-        </p:txBody>
-      </p:sp>
-      <p:sp>
-        <p:nvSpPr>
-          <p:cNvPr id="4" name="幻灯片编号占位符 3"/>
+            <a:endParaRPr lang="en-US" dirty="0"/>
+          </a:p>
+        </p:txBody>
+      </p:sp>
+      <p:sp>
+        <p:nvSpPr>
+          <p:cNvPr id="4" name="Slide Number Placeholder 3"/>
           <p:cNvSpPr>
             <a:spLocks noGrp="1"/>
           </p:cNvSpPr>
@@ -896,8 +931,8 @@
           <a:lstStyle/>
           <a:p>
             <a:fld id="{E10A885E-95FB-48AA-A3B2-ABB309CE7A18}" type="slidenum">
-              <a:rPr lang="en-US" smtClean="0"/>
-              <a:t>11</a:t>
+              <a:rPr lang="en-US"/>
+              <a:t>8</a:t>
             </a:fld>
             <a:endParaRPr lang="en-US" dirty="0"/>
           </a:p>
@@ -906,7 +941,7 @@
     </p:spTree>
     <p:extLst>
       <p:ext uri="{BB962C8B-B14F-4D97-AF65-F5344CB8AC3E}">
-        <p14:creationId xmlns:p14="http://schemas.microsoft.com/office/powerpoint/2010/main" val="2599208867"/>
+        <p14:creationId xmlns:p14="http://schemas.microsoft.com/office/powerpoint/2010/main" val="4004456771"/>
       </p:ext>
     </p:extLst>
   </p:cSld>
@@ -981,6 +1016,174 @@
           <a:p>
             <a:fld id="{E10A885E-95FB-48AA-A3B2-ABB309CE7A18}" type="slidenum">
               <a:rPr lang="en-US"/>
+              <a:t>9</a:t>
+            </a:fld>
+            <a:endParaRPr lang="en-US" dirty="0"/>
+          </a:p>
+        </p:txBody>
+      </p:sp>
+    </p:spTree>
+    <p:extLst>
+      <p:ext uri="{BB962C8B-B14F-4D97-AF65-F5344CB8AC3E}">
+        <p14:creationId xmlns:p14="http://schemas.microsoft.com/office/powerpoint/2010/main" val="309706012"/>
+      </p:ext>
+    </p:extLst>
+  </p:cSld>
+  <p:clrMapOvr>
+    <a:masterClrMapping/>
+  </p:clrMapOvr>
+</p:notes>
+</file>
+
+<file path=ppt/notesSlides/notesSlide7.xml><?xml version="1.0" encoding="utf-8"?>
+<p:notes xmlns:a="http://schemas.openxmlformats.org/drawingml/2006/main" xmlns:r="http://schemas.openxmlformats.org/officeDocument/2006/relationships" xmlns:p="http://schemas.openxmlformats.org/presentationml/2006/main">
+  <p:cSld>
+    <p:spTree>
+      <p:nvGrpSpPr>
+        <p:cNvPr id="1" name=""/>
+        <p:cNvGrpSpPr/>
+        <p:nvPr/>
+      </p:nvGrpSpPr>
+      <p:grpSpPr>
+        <a:xfrm>
+          <a:off x="0" y="0"/>
+          <a:ext cx="0" cy="0"/>
+          <a:chOff x="0" y="0"/>
+          <a:chExt cx="0" cy="0"/>
+        </a:xfrm>
+      </p:grpSpPr>
+      <p:sp>
+        <p:nvSpPr>
+          <p:cNvPr id="2" name="幻灯片图像占位符 1"/>
+          <p:cNvSpPr>
+            <a:spLocks noGrp="1" noRot="1" noChangeAspect="1"/>
+          </p:cNvSpPr>
+          <p:nvPr>
+            <p:ph type="sldImg"/>
+          </p:nvPr>
+        </p:nvSpPr>
+        <p:spPr/>
+      </p:sp>
+      <p:sp>
+        <p:nvSpPr>
+          <p:cNvPr id="3" name="备注占位符 2"/>
+          <p:cNvSpPr>
+            <a:spLocks noGrp="1"/>
+          </p:cNvSpPr>
+          <p:nvPr>
+            <p:ph type="body" idx="1"/>
+          </p:nvPr>
+        </p:nvSpPr>
+        <p:spPr/>
+        <p:txBody>
+          <a:bodyPr/>
+          <a:lstStyle/>
+          <a:p>
+            <a:endParaRPr kumimoji="1" lang="zh-CN" altLang="en-US" dirty="0"/>
+          </a:p>
+        </p:txBody>
+      </p:sp>
+      <p:sp>
+        <p:nvSpPr>
+          <p:cNvPr id="4" name="幻灯片编号占位符 3"/>
+          <p:cNvSpPr>
+            <a:spLocks noGrp="1"/>
+          </p:cNvSpPr>
+          <p:nvPr>
+            <p:ph type="sldNum" sz="quarter" idx="10"/>
+          </p:nvPr>
+        </p:nvSpPr>
+        <p:spPr/>
+        <p:txBody>
+          <a:bodyPr/>
+          <a:lstStyle/>
+          <a:p>
+            <a:fld id="{E10A885E-95FB-48AA-A3B2-ABB309CE7A18}" type="slidenum">
+              <a:rPr lang="en-US" smtClean="0"/>
+              <a:t>11</a:t>
+            </a:fld>
+            <a:endParaRPr lang="en-US" dirty="0"/>
+          </a:p>
+        </p:txBody>
+      </p:sp>
+    </p:spTree>
+    <p:extLst>
+      <p:ext uri="{BB962C8B-B14F-4D97-AF65-F5344CB8AC3E}">
+        <p14:creationId xmlns:p14="http://schemas.microsoft.com/office/powerpoint/2010/main" val="2599208867"/>
+      </p:ext>
+    </p:extLst>
+  </p:cSld>
+  <p:clrMapOvr>
+    <a:masterClrMapping/>
+  </p:clrMapOvr>
+</p:notes>
+</file>
+
+<file path=ppt/notesSlides/notesSlide8.xml><?xml version="1.0" encoding="utf-8"?>
+<p:notes xmlns:a="http://schemas.openxmlformats.org/drawingml/2006/main" xmlns:r="http://schemas.openxmlformats.org/officeDocument/2006/relationships" xmlns:p="http://schemas.openxmlformats.org/presentationml/2006/main">
+  <p:cSld>
+    <p:spTree>
+      <p:nvGrpSpPr>
+        <p:cNvPr id="1" name=""/>
+        <p:cNvGrpSpPr/>
+        <p:nvPr/>
+      </p:nvGrpSpPr>
+      <p:grpSpPr>
+        <a:xfrm>
+          <a:off x="0" y="0"/>
+          <a:ext cx="0" cy="0"/>
+          <a:chOff x="0" y="0"/>
+          <a:chExt cx="0" cy="0"/>
+        </a:xfrm>
+      </p:grpSpPr>
+      <p:sp>
+        <p:nvSpPr>
+          <p:cNvPr id="2" name="Slide Image Placeholder 1"/>
+          <p:cNvSpPr>
+            <a:spLocks noGrp="1" noRot="1" noChangeAspect="1"/>
+          </p:cNvSpPr>
+          <p:nvPr>
+            <p:ph type="sldImg"/>
+          </p:nvPr>
+        </p:nvSpPr>
+        <p:spPr/>
+      </p:sp>
+      <p:sp>
+        <p:nvSpPr>
+          <p:cNvPr id="3" name="Notes Placeholder 2"/>
+          <p:cNvSpPr>
+            <a:spLocks noGrp="1"/>
+          </p:cNvSpPr>
+          <p:nvPr>
+            <p:ph type="body" idx="1"/>
+          </p:nvPr>
+        </p:nvSpPr>
+        <p:spPr/>
+        <p:txBody>
+          <a:bodyPr/>
+          <a:lstStyle/>
+          <a:p>
+            <a:endParaRPr lang="en-US" dirty="0"/>
+          </a:p>
+        </p:txBody>
+      </p:sp>
+      <p:sp>
+        <p:nvSpPr>
+          <p:cNvPr id="4" name="Slide Number Placeholder 3"/>
+          <p:cNvSpPr>
+            <a:spLocks noGrp="1"/>
+          </p:cNvSpPr>
+          <p:nvPr>
+            <p:ph type="sldNum" sz="quarter" idx="10"/>
+          </p:nvPr>
+        </p:nvSpPr>
+        <p:spPr/>
+        <p:txBody>
+          <a:bodyPr/>
+          <a:lstStyle/>
+          <a:p>
+            <a:fld id="{E10A885E-95FB-48AA-A3B2-ABB309CE7A18}" type="slidenum">
+              <a:rPr lang="en-US"/>
               <a:t>13</a:t>
             </a:fld>
             <a:endParaRPr lang="en-US" dirty="0"/>
@@ -1000,7 +1203,7 @@
 </p:notes>
 </file>
 
-<file path=ppt/notesSlides/notesSlide7.xml><?xml version="1.0" encoding="utf-8"?>
+<file path=ppt/notesSlides/notesSlide9.xml><?xml version="1.0" encoding="utf-8"?>
 <p:notes xmlns:a="http://schemas.openxmlformats.org/drawingml/2006/main" xmlns:r="http://schemas.openxmlformats.org/officeDocument/2006/relationships" xmlns:p="http://schemas.openxmlformats.org/presentationml/2006/main">
   <p:cSld>
     <p:spTree>
@@ -6756,8 +6959,43 @@
           <a:p>
             <a:r>
               <a:rPr lang="en-US" dirty="0"/>
-              <a:t>Feb. 07, 2017</a:t>
-            </a:r>
+              <a:t>Feb. 07, </a:t>
+            </a:r>
+            <a:r>
+              <a:rPr lang="en-US" dirty="0" smtClean="0"/>
+              <a:t>2017</a:t>
+            </a:r>
+          </a:p>
+          <a:p>
+            <a:r>
+              <a:rPr lang="en-US" dirty="0" smtClean="0"/>
+              <a:t>Tian Run Yang, Cheng Zhou, </a:t>
+            </a:r>
+            <a:r>
+              <a:rPr lang="en-US" dirty="0" err="1" smtClean="0"/>
+              <a:t>Shiyuan</a:t>
+            </a:r>
+            <a:r>
+              <a:rPr lang="en-US" dirty="0" smtClean="0"/>
+              <a:t> Wu, </a:t>
+            </a:r>
+            <a:r>
+              <a:rPr lang="en-US" dirty="0" err="1" smtClean="0"/>
+              <a:t>Yida</a:t>
+            </a:r>
+            <a:r>
+              <a:rPr lang="en-US" dirty="0" smtClean="0"/>
+              <a:t> Wang, and </a:t>
+            </a:r>
+            <a:r>
+              <a:rPr lang="en-US" dirty="0" err="1" smtClean="0"/>
+              <a:t>Mengtian</a:t>
+            </a:r>
+            <a:r>
+              <a:rPr lang="en-US" dirty="0" smtClean="0"/>
+              <a:t> Ni</a:t>
+            </a:r>
+            <a:endParaRPr lang="en-US" dirty="0"/>
           </a:p>
         </p:txBody>
       </p:sp>
@@ -6842,21 +7080,21 @@
                 <a:gridCol w="1473551">
                   <a:extLst>
                     <a:ext uri="{9D8B030D-6E8A-4147-A177-3AD203B41FA5}">
-                      <a16:colId xmlns:a16="http://schemas.microsoft.com/office/drawing/2014/main" val="20000"/>
+                      <a16:colId xmlns:a16="http://schemas.microsoft.com/office/drawing/2014/main" xmlns="" val="20000"/>
                     </a:ext>
                   </a:extLst>
                 </a:gridCol>
                 <a:gridCol w="3614386">
                   <a:extLst>
                     <a:ext uri="{9D8B030D-6E8A-4147-A177-3AD203B41FA5}">
-                      <a16:colId xmlns:a16="http://schemas.microsoft.com/office/drawing/2014/main" val="20001"/>
+                      <a16:colId xmlns:a16="http://schemas.microsoft.com/office/drawing/2014/main" xmlns="" val="20001"/>
                     </a:ext>
                   </a:extLst>
                 </a:gridCol>
                 <a:gridCol w="3416301">
                   <a:extLst>
                     <a:ext uri="{9D8B030D-6E8A-4147-A177-3AD203B41FA5}">
-                      <a16:colId xmlns:a16="http://schemas.microsoft.com/office/drawing/2014/main" val="20002"/>
+                      <a16:colId xmlns:a16="http://schemas.microsoft.com/office/drawing/2014/main" xmlns="" val="20002"/>
                     </a:ext>
                   </a:extLst>
                 </a:gridCol>
@@ -6900,7 +7138,7 @@
                 </a:tc>
                 <a:extLst>
                   <a:ext uri="{0D108BD9-81ED-4DB2-BD59-A6C34878D82A}">
-                    <a16:rowId xmlns:a16="http://schemas.microsoft.com/office/drawing/2014/main" val="10000"/>
+                    <a16:rowId xmlns:a16="http://schemas.microsoft.com/office/drawing/2014/main" xmlns="" val="10000"/>
                   </a:ext>
                 </a:extLst>
               </a:tr>
@@ -6956,7 +7194,7 @@
                 </a:tc>
                 <a:extLst>
                   <a:ext uri="{0D108BD9-81ED-4DB2-BD59-A6C34878D82A}">
-                    <a16:rowId xmlns:a16="http://schemas.microsoft.com/office/drawing/2014/main" val="10001"/>
+                    <a16:rowId xmlns:a16="http://schemas.microsoft.com/office/drawing/2014/main" xmlns="" val="10001"/>
                   </a:ext>
                 </a:extLst>
               </a:tr>
@@ -7032,7 +7270,7 @@
                 </a:tc>
                 <a:extLst>
                   <a:ext uri="{0D108BD9-81ED-4DB2-BD59-A6C34878D82A}">
-                    <a16:rowId xmlns:a16="http://schemas.microsoft.com/office/drawing/2014/main" val="10002"/>
+                    <a16:rowId xmlns:a16="http://schemas.microsoft.com/office/drawing/2014/main" xmlns="" val="10002"/>
                   </a:ext>
                 </a:extLst>
               </a:tr>
@@ -7102,7 +7340,7 @@
                 </a:tc>
                 <a:extLst>
                   <a:ext uri="{0D108BD9-81ED-4DB2-BD59-A6C34878D82A}">
-                    <a16:rowId xmlns:a16="http://schemas.microsoft.com/office/drawing/2014/main" val="10003"/>
+                    <a16:rowId xmlns:a16="http://schemas.microsoft.com/office/drawing/2014/main" xmlns="" val="10003"/>
                   </a:ext>
                 </a:extLst>
               </a:tr>
@@ -7148,7 +7386,7 @@
                 </a:tc>
                 <a:extLst>
                   <a:ext uri="{0D108BD9-81ED-4DB2-BD59-A6C34878D82A}">
-                    <a16:rowId xmlns:a16="http://schemas.microsoft.com/office/drawing/2014/main" val="10004"/>
+                    <a16:rowId xmlns:a16="http://schemas.microsoft.com/office/drawing/2014/main" xmlns="" val="10004"/>
                   </a:ext>
                 </a:extLst>
               </a:tr>
@@ -7204,7 +7442,7 @@
                 </a:tc>
                 <a:extLst>
                   <a:ext uri="{0D108BD9-81ED-4DB2-BD59-A6C34878D82A}">
-                    <a16:rowId xmlns:a16="http://schemas.microsoft.com/office/drawing/2014/main" val="10005"/>
+                    <a16:rowId xmlns:a16="http://schemas.microsoft.com/office/drawing/2014/main" xmlns="" val="10005"/>
                   </a:ext>
                 </a:extLst>
               </a:tr>
@@ -7266,7 +7504,7 @@
                 </a:tc>
                 <a:extLst>
                   <a:ext uri="{0D108BD9-81ED-4DB2-BD59-A6C34878D82A}">
-                    <a16:rowId xmlns:a16="http://schemas.microsoft.com/office/drawing/2014/main" val="10006"/>
+                    <a16:rowId xmlns:a16="http://schemas.microsoft.com/office/drawing/2014/main" xmlns="" val="10006"/>
                   </a:ext>
                 </a:extLst>
               </a:tr>
@@ -7655,13 +7893,8 @@
           <a:p>
             <a:r>
               <a:rPr lang="en-US" dirty="0"/>
-              <a:t>Comparison of technical analysis and </a:t>
-            </a:r>
-            <a:r>
-              <a:rPr lang="en-US"/>
-              <a:t>fundamental analysis</a:t>
-            </a:r>
-            <a:endParaRPr lang="en-US" dirty="0"/>
+              <a:t>Comparison of technical analysis and fundamental analysis</a:t>
+            </a:r>
           </a:p>
         </p:txBody>
       </p:sp>
@@ -7717,25 +7950,49 @@
           </a:p>
         </p:txBody>
       </p:sp>
-      <p:sp>
-        <p:nvSpPr>
-          <p:cNvPr id="3" name="Content Placeholder 2"/>
-          <p:cNvSpPr>
-            <a:spLocks noGrp="1"/>
-          </p:cNvSpPr>
+      <p:pic>
+        <p:nvPicPr>
+          <p:cNvPr id="2050" name="Picture 2" descr="Image result for questions and answers"/>
+          <p:cNvPicPr>
+            <a:picLocks noGrp="1" noChangeAspect="1" noChangeArrowheads="1"/>
+          </p:cNvPicPr>
           <p:nvPr>
             <p:ph idx="1"/>
           </p:nvPr>
-        </p:nvSpPr>
-        <p:spPr/>
-        <p:txBody>
-          <a:bodyPr/>
-          <a:lstStyle/>
-          <a:p>
-            <a:endParaRPr lang="en-US" dirty="0"/>
-          </a:p>
-        </p:txBody>
-      </p:sp>
+        </p:nvPicPr>
+        <p:blipFill>
+          <a:blip r:embed="rId3">
+            <a:extLst>
+              <a:ext uri="{28A0092B-C50C-407E-A947-70E740481C1C}">
+                <a14:useLocalDpi xmlns:a14="http://schemas.microsoft.com/office/drawing/2010/main" val="0"/>
+              </a:ext>
+            </a:extLst>
+          </a:blip>
+          <a:srcRect/>
+          <a:stretch>
+            <a:fillRect/>
+          </a:stretch>
+        </p:blipFill>
+        <p:spPr bwMode="auto">
+          <a:xfrm>
+            <a:off x="1454325" y="2016474"/>
+            <a:ext cx="7042685" cy="3250470"/>
+          </a:xfrm>
+          <a:prstGeom prst="rect">
+            <a:avLst/>
+          </a:prstGeom>
+          <a:noFill/>
+          <a:extLst>
+            <a:ext uri="{909E8E84-426E-40DD-AFC4-6F175D3DCCD1}">
+              <a14:hiddenFill xmlns:a14="http://schemas.microsoft.com/office/drawing/2010/main">
+                <a:solidFill>
+                  <a:srgbClr val="FFFFFF"/>
+                </a:solidFill>
+              </a14:hiddenFill>
+            </a:ext>
+          </a:extLst>
+        </p:spPr>
+      </p:pic>
     </p:spTree>
     <p:extLst>
       <p:ext uri="{BB962C8B-B14F-4D97-AF65-F5344CB8AC3E}">
@@ -7788,25 +8045,49 @@
           </a:p>
         </p:txBody>
       </p:sp>
-      <p:sp>
-        <p:nvSpPr>
-          <p:cNvPr id="3" name="Content Placeholder 2"/>
-          <p:cNvSpPr>
-            <a:spLocks noGrp="1"/>
-          </p:cNvSpPr>
+      <p:pic>
+        <p:nvPicPr>
+          <p:cNvPr id="3074" name="Picture 2" descr="Image result for thank you presentation"/>
+          <p:cNvPicPr>
+            <a:picLocks noGrp="1" noChangeAspect="1" noChangeArrowheads="1"/>
+          </p:cNvPicPr>
           <p:nvPr>
             <p:ph idx="1"/>
           </p:nvPr>
-        </p:nvSpPr>
-        <p:spPr/>
-        <p:txBody>
-          <a:bodyPr/>
-          <a:lstStyle/>
-          <a:p>
-            <a:endParaRPr lang="en-US" dirty="0"/>
-          </a:p>
-        </p:txBody>
-      </p:sp>
+        </p:nvPicPr>
+        <p:blipFill>
+          <a:blip r:embed="rId3">
+            <a:extLst>
+              <a:ext uri="{28A0092B-C50C-407E-A947-70E740481C1C}">
+                <a14:useLocalDpi xmlns:a14="http://schemas.microsoft.com/office/drawing/2010/main" val="0"/>
+              </a:ext>
+            </a:extLst>
+          </a:blip>
+          <a:srcRect/>
+          <a:stretch>
+            <a:fillRect/>
+          </a:stretch>
+        </p:blipFill>
+        <p:spPr bwMode="auto">
+          <a:xfrm>
+            <a:off x="677863" y="3287434"/>
+            <a:ext cx="8596312" cy="1627744"/>
+          </a:xfrm>
+          <a:prstGeom prst="rect">
+            <a:avLst/>
+          </a:prstGeom>
+          <a:noFill/>
+          <a:extLst>
+            <a:ext uri="{909E8E84-426E-40DD-AFC4-6F175D3DCCD1}">
+              <a14:hiddenFill xmlns:a14="http://schemas.microsoft.com/office/drawing/2010/main">
+                <a:solidFill>
+                  <a:srgbClr val="FFFFFF"/>
+                </a:solidFill>
+              </a14:hiddenFill>
+            </a:ext>
+          </a:extLst>
+        </p:spPr>
+      </p:pic>
     </p:spTree>
     <p:extLst>
       <p:ext uri="{BB962C8B-B14F-4D97-AF65-F5344CB8AC3E}">
@@ -7853,37 +8134,47 @@
           <a:lstStyle/>
           <a:p>
             <a:r>
+              <a:rPr lang="en-US" dirty="0" smtClean="0"/>
+              <a:t>Presentation Outline</a:t>
+            </a:r>
+            <a:endParaRPr lang="en-US" dirty="0"/>
+          </a:p>
+        </p:txBody>
+      </p:sp>
+      <p:sp>
+        <p:nvSpPr>
+          <p:cNvPr id="3" name="Content Placeholder 2"/>
+          <p:cNvSpPr>
+            <a:spLocks noGrp="1"/>
+          </p:cNvSpPr>
+          <p:nvPr>
+            <p:ph idx="1"/>
+          </p:nvPr>
+        </p:nvSpPr>
+        <p:spPr/>
+        <p:txBody>
+          <a:bodyPr/>
+          <a:lstStyle/>
+          <a:p>
+            <a:r>
               <a:rPr lang="en-US" dirty="0"/>
-              <a:t>Problem Statement</a:t>
-            </a:r>
-          </a:p>
-        </p:txBody>
-      </p:sp>
-      <p:sp>
-        <p:nvSpPr>
-          <p:cNvPr id="3" name="Content Placeholder 2"/>
-          <p:cNvSpPr>
-            <a:spLocks noGrp="1"/>
-          </p:cNvSpPr>
-          <p:nvPr>
-            <p:ph idx="1"/>
-          </p:nvPr>
-        </p:nvSpPr>
-        <p:spPr/>
-        <p:txBody>
-          <a:bodyPr/>
-          <a:lstStyle/>
-          <a:p>
+              <a:t>Technical </a:t>
+            </a:r>
+            <a:r>
+              <a:rPr lang="en-US" dirty="0" smtClean="0"/>
+              <a:t>Analysis </a:t>
+            </a:r>
             <a:r>
               <a:rPr lang="en-US" dirty="0"/>
-              <a:t>Technical analysis definition</a:t>
-            </a:r>
-          </a:p>
-          <a:p>
-            <a:r>
-              <a:rPr lang="en-US" dirty="0"/>
-              <a:t>Indicators</a:t>
-            </a:r>
+              <a:t>definition</a:t>
+            </a:r>
+          </a:p>
+          <a:p>
+            <a:r>
+              <a:rPr lang="en-US" dirty="0" smtClean="0"/>
+              <a:t>Indicators &amp; Oscillators</a:t>
+            </a:r>
+            <a:endParaRPr lang="en-US" dirty="0"/>
           </a:p>
           <a:p>
             <a:r>
@@ -7974,7 +8265,19 @@
           <a:p>
             <a:r>
               <a:rPr lang="en-US" dirty="0"/>
-              <a:t>Equity analysis methodology for forecasting the direction of prices using historic data, mostly based on price and volume</a:t>
+              <a:t>Equity analysis methodology for forecasting the direction of prices using historic data, mostly based on </a:t>
+            </a:r>
+            <a:r>
+              <a:rPr lang="en-US" b="1" dirty="0"/>
+              <a:t>price</a:t>
+            </a:r>
+            <a:r>
+              <a:rPr lang="en-US" dirty="0"/>
+              <a:t> and </a:t>
+            </a:r>
+            <a:r>
+              <a:rPr lang="en-US" b="1" dirty="0"/>
+              <a:t>volume</a:t>
             </a:r>
           </a:p>
           <a:p>
@@ -8199,7 +8502,7 @@
           <p:nvPr/>
         </p:nvPicPr>
         <p:blipFill>
-          <a:blip r:embed="rId2" cstate="print"/>
+          <a:blip r:embed="rId3" cstate="print"/>
           <a:srcRect/>
           <a:stretch>
             <a:fillRect/>
@@ -8367,7 +8670,7 @@
           <a:graphicData uri="http://schemas.openxmlformats.org/presentationml/2006/ole">
             <mc:AlternateContent xmlns:mc="http://schemas.openxmlformats.org/markup-compatibility/2006">
               <mc:Choice xmlns:v="urn:schemas-microsoft-com:vml" Requires="v">
-                <p:oleObj spid="_x0000_s1047" name="Equation" r:id="rId4" imgW="3708360" imgH="914400" progId="">
+                <p:oleObj spid="_x0000_s1058" name="Equation" r:id="rId4" imgW="3708360" imgH="914400" progId="">
                   <p:embed/>
                 </p:oleObj>
               </mc:Choice>
@@ -8406,7 +8709,7 @@
                       <a:noFill/>
                       <a:extLst>
                         <a:ext uri="{909E8E84-426E-40dd-AFC4-6F175D3DCCD1}">
-                          <a14:hiddenFill xmlns:a14="http://schemas.microsoft.com/office/drawing/2010/main" xmlns="">
+                          <a14:hiddenFill xmlns="" xmlns:a14="http://schemas.microsoft.com/office/drawing/2010/main">
                             <a:solidFill>
                               <a:srgbClr val="FFFFFF"/>
                             </a:solidFill>
@@ -8637,8 +8940,8 @@
           </a:p>
         </p:txBody>
       </p:sp>
-      <mc:AlternateContent xmlns:mc="http://schemas.openxmlformats.org/markup-compatibility/2006">
-        <mc:Choice xmlns:a14="http://schemas.microsoft.com/office/drawing/2010/main" Requires="a14">
+      <mc:AlternateContent xmlns:mc="http://schemas.openxmlformats.org/markup-compatibility/2006" xmlns:a14="http://schemas.microsoft.com/office/drawing/2010/main">
+        <mc:Choice Requires="a14">
           <p:sp>
             <p:nvSpPr>
               <p:cNvPr id="3" name="Content Placeholder 2"/>
@@ -8848,7 +9151,7 @@
             </p:txBody>
           </p:sp>
         </mc:Choice>
-        <mc:Fallback>
+        <mc:Fallback xmlns="">
           <p:sp>
             <p:nvSpPr>
               <p:cNvPr id="3" name="Content Placeholder 2"/>

</xml_diff>

<commit_message>
modified the comparison part
</commit_message>
<xml_diff>
--- a/Technical Analysis-comparison.pptx
+++ b/Technical Analysis-comparison.pptx
@@ -123,7 +123,7 @@
   </p:defaultTextStyle>
   <p:extLst>
     <p:ext uri="{EFAFB233-063F-42B5-8137-9DF3F51BA10A}">
-      <p15:sldGuideLst xmlns:p15="http://schemas.microsoft.com/office/powerpoint/2012/main">
+      <p15:sldGuideLst xmlns:p15="http://schemas.microsoft.com/office/powerpoint/2012/main" xmlns="">
         <p15:guide id="1" orient="horz" pos="2160">
           <p15:clr>
             <a:srgbClr val="A4A3A4"/>
@@ -222,7 +222,7 @@
           <a:p>
             <a:fld id="{F4C5F61B-2629-4711-AA38-264E458EB4B6}" type="datetimeFigureOut">
               <a:rPr lang="en-US"/>
-              <a:t>2/7/2017</a:t>
+              <a:t>17-02-07</a:t>
             </a:fld>
             <a:endParaRPr lang="en-US" dirty="0"/>
           </a:p>
@@ -2051,7 +2051,7 @@
             <a:fld id="{B61BEF0D-F0BB-DE4B-95CE-6DB70DBA9567}" type="datetimeFigureOut">
               <a:rPr lang="en-US"/>
               <a:pPr/>
-              <a:t>2/7/2017</a:t>
+              <a:t>17-02-07</a:t>
             </a:fld>
             <a:endParaRPr lang="en-US" dirty="0"/>
           </a:p>
@@ -2298,7 +2298,7 @@
             <a:fld id="{B61BEF0D-F0BB-DE4B-95CE-6DB70DBA9567}" type="datetimeFigureOut">
               <a:rPr lang="en-US"/>
               <a:pPr/>
-              <a:t>2/7/2017</a:t>
+              <a:t>17-02-07</a:t>
             </a:fld>
             <a:endParaRPr lang="en-US" dirty="0"/>
           </a:p>
@@ -2608,7 +2608,7 @@
             <a:fld id="{B61BEF0D-F0BB-DE4B-95CE-6DB70DBA9567}" type="datetimeFigureOut">
               <a:rPr lang="en-US"/>
               <a:pPr/>
-              <a:t>2/7/2017</a:t>
+              <a:t>17-02-07</a:t>
             </a:fld>
             <a:endParaRPr lang="en-US" dirty="0"/>
           </a:p>
@@ -2945,7 +2945,7 @@
             <a:fld id="{B61BEF0D-F0BB-DE4B-95CE-6DB70DBA9567}" type="datetimeFigureOut">
               <a:rPr lang="en-US"/>
               <a:pPr/>
-              <a:t>2/7/2017</a:t>
+              <a:t>17-02-07</a:t>
             </a:fld>
             <a:endParaRPr lang="en-US" dirty="0"/>
           </a:p>
@@ -3255,7 +3255,7 @@
             <a:fld id="{B61BEF0D-F0BB-DE4B-95CE-6DB70DBA9567}" type="datetimeFigureOut">
               <a:rPr lang="en-US"/>
               <a:pPr/>
-              <a:t>2/7/2017</a:t>
+              <a:t>17-02-07</a:t>
             </a:fld>
             <a:endParaRPr lang="en-US" dirty="0"/>
           </a:p>
@@ -3644,7 +3644,7 @@
             <a:fld id="{B61BEF0D-F0BB-DE4B-95CE-6DB70DBA9567}" type="datetimeFigureOut">
               <a:rPr lang="en-US"/>
               <a:pPr/>
-              <a:t>2/7/2017</a:t>
+              <a:t>17-02-07</a:t>
             </a:fld>
             <a:endParaRPr lang="en-US" dirty="0"/>
           </a:p>
@@ -3808,7 +3808,7 @@
           <a:p>
             <a:fld id="{55C6B4A9-1611-4792-9094-5F34BCA07E0B}" type="datetimeFigureOut">
               <a:rPr lang="en-US"/>
-              <a:t>2/7/2017</a:t>
+              <a:t>17-02-07</a:t>
             </a:fld>
             <a:endParaRPr lang="en-US" dirty="0"/>
           </a:p>
@@ -3982,7 +3982,7 @@
             <a:fld id="{B61BEF0D-F0BB-DE4B-95CE-6DB70DBA9567}" type="datetimeFigureOut">
               <a:rPr lang="en-US"/>
               <a:pPr/>
-              <a:t>2/7/2017</a:t>
+              <a:t>17-02-07</a:t>
             </a:fld>
             <a:endParaRPr lang="en-US" dirty="0"/>
           </a:p>
@@ -4153,7 +4153,7 @@
             <a:fld id="{B61BEF0D-F0BB-DE4B-95CE-6DB70DBA9567}" type="datetimeFigureOut">
               <a:rPr lang="en-US"/>
               <a:pPr/>
-              <a:t>2/7/2017</a:t>
+              <a:t>17-02-07</a:t>
             </a:fld>
             <a:endParaRPr lang="en-US" dirty="0"/>
           </a:p>
@@ -4396,7 +4396,7 @@
             <a:fld id="{B61BEF0D-F0BB-DE4B-95CE-6DB70DBA9567}" type="datetimeFigureOut">
               <a:rPr lang="en-US"/>
               <a:pPr/>
-              <a:t>2/7/2017</a:t>
+              <a:t>17-02-07</a:t>
             </a:fld>
             <a:endParaRPr lang="en-US" dirty="0"/>
           </a:p>
@@ -4621,7 +4621,7 @@
           <a:p>
             <a:fld id="{EB712588-04B1-427B-82EE-E8DB90309F08}" type="datetimeFigureOut">
               <a:rPr lang="en-US"/>
-              <a:t>2/7/2017</a:t>
+              <a:t>17-02-07</a:t>
             </a:fld>
             <a:endParaRPr lang="en-US" dirty="0"/>
           </a:p>
@@ -4988,7 +4988,7 @@
             <a:fld id="{B61BEF0D-F0BB-DE4B-95CE-6DB70DBA9567}" type="datetimeFigureOut">
               <a:rPr lang="en-US"/>
               <a:pPr/>
-              <a:t>2/7/2017</a:t>
+              <a:t>17-02-07</a:t>
             </a:fld>
             <a:endParaRPr lang="en-US" dirty="0"/>
           </a:p>
@@ -5107,7 +5107,7 @@
             <a:fld id="{B61BEF0D-F0BB-DE4B-95CE-6DB70DBA9567}" type="datetimeFigureOut">
               <a:rPr lang="en-US"/>
               <a:pPr/>
-              <a:t>2/7/2017</a:t>
+              <a:t>17-02-07</a:t>
             </a:fld>
             <a:endParaRPr lang="en-US" dirty="0"/>
           </a:p>
@@ -5199,7 +5199,7 @@
             <a:fld id="{B61BEF0D-F0BB-DE4B-95CE-6DB70DBA9567}" type="datetimeFigureOut">
               <a:rPr lang="en-US"/>
               <a:pPr/>
-              <a:t>2/7/2017</a:t>
+              <a:t>17-02-07</a:t>
             </a:fld>
             <a:endParaRPr lang="en-US" dirty="0"/>
           </a:p>
@@ -5448,7 +5448,7 @@
           <a:p>
             <a:fld id="{42A54C80-263E-416B-A8E0-580EDEADCBDC}" type="datetimeFigureOut">
               <a:rPr lang="en-US"/>
-              <a:t>2/7/2017</a:t>
+              <a:t>17-02-07</a:t>
             </a:fld>
             <a:endParaRPr lang="en-US" dirty="0"/>
           </a:p>
@@ -5705,7 +5705,7 @@
             <a:fld id="{B61BEF0D-F0BB-DE4B-95CE-6DB70DBA9567}" type="datetimeFigureOut">
               <a:rPr lang="en-US"/>
               <a:pPr/>
-              <a:t>2/7/2017</a:t>
+              <a:t>17-02-07</a:t>
             </a:fld>
             <a:endParaRPr lang="en-US" dirty="0"/>
           </a:p>
@@ -6443,7 +6443,7 @@
             <a:fld id="{B61BEF0D-F0BB-DE4B-95CE-6DB70DBA9567}" type="datetimeFigureOut">
               <a:rPr lang="en-US"/>
               <a:pPr/>
-              <a:t>2/7/2017</a:t>
+              <a:t>17-02-07</a:t>
             </a:fld>
             <a:endParaRPr lang="en-US" dirty="0"/>
           </a:p>
@@ -7082,7 +7082,7 @@
                   <a:buNone/>
                 </a:pPr>
                 <a14:m>
-                  <m:oMathPara xmlns:m="http://schemas.openxmlformats.org/officeDocument/2006/math">
+                  <m:oMathPara xmlns:m="http://schemas.openxmlformats.org/officeDocument/2006/math" xmlns="">
                     <m:oMathParaPr>
                       <m:jc m:val="centerGroup"/>
                     </m:oMathParaPr>
@@ -7148,7 +7148,7 @@
                   <a:t> 	</a:t>
                 </a:r>
                 <a14:m>
-                  <m:oMath xmlns:m="http://schemas.openxmlformats.org/officeDocument/2006/math">
+                  <m:oMath xmlns:m="http://schemas.openxmlformats.org/officeDocument/2006/math" xmlns="">
                     <m:sSup>
                       <m:sSupPr>
                         <m:ctrlPr>
@@ -7199,7 +7199,7 @@
                   <a:t>	</a:t>
                 </a:r>
                 <a14:m>
-                  <m:oMath xmlns:m="http://schemas.openxmlformats.org/officeDocument/2006/math">
+                  <m:oMath xmlns:m="http://schemas.openxmlformats.org/officeDocument/2006/math" xmlns="">
                     <m:r>
                       <a:rPr lang="en-CA" sz="3600" b="0" i="1" smtClean="0">
                         <a:latin typeface="Cambria Math" panose="02040503050406030204" pitchFamily="18" charset="0"/>
@@ -7344,14 +7344,35 @@
             <p:ph type="title"/>
           </p:nvPr>
         </p:nvSpPr>
-        <p:spPr/>
+        <p:spPr>
+          <a:xfrm>
+            <a:off x="619608" y="609600"/>
+            <a:ext cx="9932940" cy="1320800"/>
+          </a:xfrm>
+        </p:spPr>
         <p:txBody>
           <a:bodyPr/>
           <a:lstStyle/>
           <a:p>
             <a:r>
+              <a:rPr lang="en-US" altLang="zh-CN" dirty="0" smtClean="0"/>
+              <a:t>Fundamental Analysis VS</a:t>
+            </a:r>
+            <a:r>
+              <a:rPr lang="en-US" dirty="0" smtClean="0"/>
+              <a:t> </a:t>
+            </a:r>
+            <a:r>
+              <a:rPr lang="en-US" altLang="zh-CN" dirty="0" smtClean="0"/>
+              <a:t>Technical </a:t>
+            </a:r>
+            <a:r>
+              <a:rPr lang="en-US" dirty="0" smtClean="0"/>
+              <a:t> </a:t>
+            </a:r>
+            <a:r>
               <a:rPr lang="en-US" dirty="0"/>
-              <a:t>Comparison with Fundamental Analysis </a:t>
+              <a:t>Analysis </a:t>
             </a:r>
           </a:p>
         </p:txBody>
@@ -7366,14 +7387,14 @@
             <p:ph idx="1"/>
             <p:extLst>
               <p:ext uri="{D42A27DB-BD31-4B8C-83A1-F6EECF244321}">
-                <p14:modId xmlns:p14="http://schemas.microsoft.com/office/powerpoint/2010/main" val="280881277"/>
+                <p14:modId xmlns:p14="http://schemas.microsoft.com/office/powerpoint/2010/main" val="4074706501"/>
               </p:ext>
             </p:extLst>
           </p:nvPr>
         </p:nvGraphicFramePr>
         <p:xfrm>
           <a:off x="723549" y="1563688"/>
-          <a:ext cx="8504238" cy="5034280"/>
+          <a:ext cx="8504238" cy="5034279"/>
         </p:xfrm>
         <a:graphic>
           <a:graphicData uri="http://schemas.openxmlformats.org/drawingml/2006/table">
@@ -7385,21 +7406,21 @@
                 <a:gridCol w="1473551">
                   <a:extLst>
                     <a:ext uri="{9D8B030D-6E8A-4147-A177-3AD203B41FA5}">
-                      <a16:colId xmlns:a16="http://schemas.microsoft.com/office/drawing/2014/main" val="20000"/>
+                      <a16:colId xmlns:a16="http://schemas.microsoft.com/office/drawing/2014/main" xmlns="" val="20000"/>
                     </a:ext>
                   </a:extLst>
                 </a:gridCol>
                 <a:gridCol w="3614386">
                   <a:extLst>
                     <a:ext uri="{9D8B030D-6E8A-4147-A177-3AD203B41FA5}">
-                      <a16:colId xmlns:a16="http://schemas.microsoft.com/office/drawing/2014/main" val="20001"/>
+                      <a16:colId xmlns:a16="http://schemas.microsoft.com/office/drawing/2014/main" xmlns="" val="20001"/>
                     </a:ext>
                   </a:extLst>
                 </a:gridCol>
                 <a:gridCol w="3416301">
                   <a:extLst>
                     <a:ext uri="{9D8B030D-6E8A-4147-A177-3AD203B41FA5}">
-                      <a16:colId xmlns:a16="http://schemas.microsoft.com/office/drawing/2014/main" val="20002"/>
+                      <a16:colId xmlns:a16="http://schemas.microsoft.com/office/drawing/2014/main" xmlns="" val="20002"/>
                     </a:ext>
                   </a:extLst>
                 </a:gridCol>
@@ -7443,7 +7464,7 @@
                 </a:tc>
                 <a:extLst>
                   <a:ext uri="{0D108BD9-81ED-4DB2-BD59-A6C34878D82A}">
-                    <a16:rowId xmlns:a16="http://schemas.microsoft.com/office/drawing/2014/main" val="10000"/>
+                    <a16:rowId xmlns:a16="http://schemas.microsoft.com/office/drawing/2014/main" xmlns="" val="10000"/>
                   </a:ext>
                 </a:extLst>
               </a:tr>
@@ -7467,12 +7488,20 @@
                     <a:lstStyle/>
                     <a:p>
                       <a:r>
-                        <a:rPr lang="en-US" dirty="0"/>
-                        <a:t>Intrinsic</a:t>
+                        <a:rPr lang="en-US" dirty="0" smtClean="0"/>
+                        <a:t>Intrinsic </a:t>
+                      </a:r>
+                      <a:r>
+                        <a:rPr lang="en-US" dirty="0" smtClean="0"/>
+                        <a:t>(long-term)</a:t>
+                      </a:r>
+                      <a:r>
+                        <a:rPr lang="en-US" baseline="0" dirty="0" smtClean="0"/>
+                        <a:t> </a:t>
                       </a:r>
                       <a:r>
                         <a:rPr lang="en-US" baseline="0" dirty="0"/>
-                        <a:t> value of an asset</a:t>
+                        <a:t>value of an asset</a:t>
                       </a:r>
                       <a:endParaRPr lang="en-US" dirty="0"/>
                     </a:p>
@@ -7499,7 +7528,7 @@
                 </a:tc>
                 <a:extLst>
                   <a:ext uri="{0D108BD9-81ED-4DB2-BD59-A6C34878D82A}">
-                    <a16:rowId xmlns:a16="http://schemas.microsoft.com/office/drawing/2014/main" val="10001"/>
+                    <a16:rowId xmlns:a16="http://schemas.microsoft.com/office/drawing/2014/main" xmlns="" val="10001"/>
                   </a:ext>
                 </a:extLst>
               </a:tr>
@@ -7523,8 +7552,20 @@
                     <a:lstStyle/>
                     <a:p>
                       <a:r>
+                        <a:rPr lang="en-US" dirty="0" smtClean="0"/>
+                        <a:t>Financial</a:t>
+                      </a:r>
+                      <a:r>
+                        <a:rPr lang="en-US" baseline="0" dirty="0" smtClean="0"/>
+                        <a:t> </a:t>
+                      </a:r>
+                      <a:r>
+                        <a:rPr lang="en-US" dirty="0" smtClean="0"/>
+                        <a:t>reports</a:t>
+                      </a:r>
+                      <a:r>
                         <a:rPr lang="en-US" dirty="0"/>
-                        <a:t>Economic reports,</a:t>
+                        <a:t>,</a:t>
                       </a:r>
                       <a:r>
                         <a:rPr lang="en-US" baseline="0" dirty="0"/>
@@ -7549,12 +7590,20 @@
                         <a:t> </a:t>
                       </a:r>
                       <a:r>
-                        <a:rPr lang="en-US" altLang="zh-CN" dirty="0"/>
+                        <a:rPr lang="en-US" altLang="zh-CN" dirty="0" smtClean="0"/>
                         <a:t>price</a:t>
                       </a:r>
                       <a:r>
-                        <a:rPr lang="zh-CN" altLang="en-US" dirty="0"/>
-                        <a:t>, </a:t>
+                        <a:rPr lang="en-US" altLang="zh-CN" baseline="0" dirty="0"/>
+                        <a:t> </a:t>
+                      </a:r>
+                      <a:r>
+                        <a:rPr lang="en-US" altLang="zh-CN" baseline="0" dirty="0" smtClean="0"/>
+                        <a:t>&amp;</a:t>
+                      </a:r>
+                      <a:r>
+                        <a:rPr lang="zh-CN" altLang="en-US" dirty="0" smtClean="0"/>
+                        <a:t> </a:t>
                       </a:r>
                       <a:r>
                         <a:rPr lang="en-US" altLang="zh-CN" dirty="0"/>
@@ -7575,7 +7624,7 @@
                 </a:tc>
                 <a:extLst>
                   <a:ext uri="{0D108BD9-81ED-4DB2-BD59-A6C34878D82A}">
-                    <a16:rowId xmlns:a16="http://schemas.microsoft.com/office/drawing/2014/main" val="10002"/>
+                    <a16:rowId xmlns:a16="http://schemas.microsoft.com/office/drawing/2014/main" xmlns="" val="10002"/>
                   </a:ext>
                 </a:extLst>
               </a:tr>
@@ -7645,7 +7694,7 @@
                 </a:tc>
                 <a:extLst>
                   <a:ext uri="{0D108BD9-81ED-4DB2-BD59-A6C34878D82A}">
-                    <a16:rowId xmlns:a16="http://schemas.microsoft.com/office/drawing/2014/main" val="10003"/>
+                    <a16:rowId xmlns:a16="http://schemas.microsoft.com/office/drawing/2014/main" xmlns="" val="10003"/>
                   </a:ext>
                 </a:extLst>
               </a:tr>
@@ -7691,7 +7740,7 @@
                 </a:tc>
                 <a:extLst>
                   <a:ext uri="{0D108BD9-81ED-4DB2-BD59-A6C34878D82A}">
-                    <a16:rowId xmlns:a16="http://schemas.microsoft.com/office/drawing/2014/main" val="10004"/>
+                    <a16:rowId xmlns:a16="http://schemas.microsoft.com/office/drawing/2014/main" xmlns="" val="10004"/>
                   </a:ext>
                 </a:extLst>
               </a:tr>
@@ -7747,7 +7796,7 @@
                 </a:tc>
                 <a:extLst>
                   <a:ext uri="{0D108BD9-81ED-4DB2-BD59-A6C34878D82A}">
-                    <a16:rowId xmlns:a16="http://schemas.microsoft.com/office/drawing/2014/main" val="10005"/>
+                    <a16:rowId xmlns:a16="http://schemas.microsoft.com/office/drawing/2014/main" xmlns="" val="10005"/>
                   </a:ext>
                 </a:extLst>
               </a:tr>
@@ -7809,7 +7858,7 @@
                 </a:tc>
                 <a:extLst>
                   <a:ext uri="{0D108BD9-81ED-4DB2-BD59-A6C34878D82A}">
-                    <a16:rowId xmlns:a16="http://schemas.microsoft.com/office/drawing/2014/main" val="10006"/>
+                    <a16:rowId xmlns:a16="http://schemas.microsoft.com/office/drawing/2014/main" xmlns="" val="10006"/>
                   </a:ext>
                 </a:extLst>
               </a:tr>
@@ -7881,7 +7930,7 @@
         </p:nvSpPr>
         <p:spPr>
           <a:xfrm>
-            <a:off x="728131" y="1872720"/>
+            <a:off x="728131" y="1688000"/>
             <a:ext cx="8805336" cy="3880773"/>
           </a:xfrm>
         </p:spPr>
@@ -7893,207 +7942,457 @@
           <a:p>
             <a:pPr>
               <a:lnSpc>
-                <a:spcPct val="90000"/>
+                <a:spcPct val="80000"/>
               </a:lnSpc>
             </a:pPr>
             <a:r>
-              <a:rPr lang="en-US" dirty="0"/>
+              <a:rPr lang="en-US" sz="2000" dirty="0"/>
               <a:t>Technical</a:t>
             </a:r>
             <a:r>
-              <a:rPr lang="zh-CN" altLang="en-US" dirty="0"/>
+              <a:rPr lang="zh-CN" altLang="en-US" sz="2000" dirty="0"/>
               <a:t> </a:t>
             </a:r>
             <a:r>
-              <a:rPr lang="en-US" altLang="zh-CN" dirty="0"/>
+              <a:rPr lang="en-US" altLang="zh-CN" sz="2000" dirty="0"/>
               <a:t>Analysis</a:t>
             </a:r>
             <a:r>
-              <a:rPr lang="zh-CN" altLang="en-US" dirty="0"/>
+              <a:rPr lang="zh-CN" altLang="en-US" sz="2000" dirty="0"/>
               <a:t> </a:t>
             </a:r>
             <a:r>
-              <a:rPr lang="en-US" altLang="zh-CN" dirty="0"/>
+              <a:rPr lang="en-US" altLang="zh-CN" sz="1600" dirty="0"/>
               <a:t>only</a:t>
             </a:r>
             <a:r>
-              <a:rPr lang="zh-CN" altLang="en-US" dirty="0"/>
+              <a:rPr lang="zh-CN" altLang="en-US" sz="1600" dirty="0"/>
               <a:t> </a:t>
             </a:r>
             <a:r>
-              <a:rPr lang="en-US" altLang="zh-CN" dirty="0"/>
+              <a:rPr lang="en-US" altLang="zh-CN" sz="1600" dirty="0"/>
               <a:t>u</a:t>
             </a:r>
             <a:r>
-              <a:rPr lang="en-US" dirty="0"/>
+              <a:rPr lang="en-US" sz="1600" dirty="0"/>
               <a:t>se</a:t>
             </a:r>
             <a:r>
-              <a:rPr lang="en-US" altLang="zh-CN" dirty="0"/>
+              <a:rPr lang="en-US" altLang="zh-CN" sz="1600" dirty="0"/>
               <a:t>s</a:t>
             </a:r>
             <a:r>
-              <a:rPr lang="en-US" dirty="0"/>
-              <a:t> trading volume and share prices to project a target price</a:t>
-            </a:r>
-            <a:r>
-              <a:rPr lang="zh-CN" altLang="zh-CN" dirty="0"/>
-              <a:t>,</a:t>
-            </a:r>
-            <a:r>
-              <a:rPr lang="zh-CN" altLang="en-US" dirty="0"/>
+              <a:rPr lang="en-US" sz="1600" dirty="0"/>
               <a:t> </a:t>
             </a:r>
             <a:r>
-              <a:rPr lang="en-US" altLang="zh-CN" dirty="0"/>
-              <a:t>not</a:t>
-            </a:r>
-            <a:r>
-              <a:rPr lang="zh-CN" altLang="en-US" dirty="0"/>
+              <a:rPr lang="en-US" sz="1600" u="sng" dirty="0"/>
+              <a:t>trading volume</a:t>
+            </a:r>
+            <a:r>
+              <a:rPr lang="en-US" sz="1600" dirty="0"/>
+              <a:t> and </a:t>
+            </a:r>
+            <a:r>
+              <a:rPr lang="en-US" sz="1600" u="sng" dirty="0"/>
+              <a:t>share </a:t>
+            </a:r>
+            <a:r>
+              <a:rPr lang="en-US" sz="1600" u="sng" dirty="0" smtClean="0"/>
+              <a:t>prices</a:t>
+            </a:r>
+            <a:r>
+              <a:rPr lang="zh-CN" altLang="en-US" sz="1600" dirty="0" smtClean="0"/>
               <a:t> </a:t>
             </a:r>
-            <a:r>
-              <a:rPr lang="en-US" dirty="0"/>
-              <a:t>concerned with trader's reason for trading, but only that the trades have occurred. </a:t>
-            </a:r>
+            <a:endParaRPr lang="en-US" altLang="zh-CN" sz="1600" dirty="0" smtClean="0"/>
           </a:p>
           <a:p>
             <a:pPr>
               <a:lnSpc>
-                <a:spcPct val="90000"/>
+                <a:spcPct val="80000"/>
+              </a:lnSpc>
+              <a:buFont typeface="Wingdings" charset="0"/>
+              <a:buChar char=" "/>
+            </a:pPr>
+            <a:r>
+              <a:rPr lang="zh-CN" altLang="en-US" sz="1600" dirty="0" smtClean="0">
+                <a:latin typeface="Wingdings"/>
+                <a:ea typeface="Wingdings"/>
+                <a:cs typeface="Wingdings"/>
+                <a:sym typeface="Wingdings"/>
+              </a:rPr>
+              <a:t></a:t>
+            </a:r>
+            <a:r>
+              <a:rPr lang="en-US" altLang="zh-CN" sz="1600" dirty="0" smtClean="0">
+                <a:sym typeface="Wingdings"/>
+              </a:rPr>
+              <a:t> </a:t>
+            </a:r>
+            <a:r>
+              <a:rPr lang="en-US" altLang="zh-CN" sz="1400" dirty="0" smtClean="0"/>
+              <a:t>not</a:t>
+            </a:r>
+            <a:r>
+              <a:rPr lang="zh-CN" altLang="en-US" sz="1400" dirty="0" smtClean="0"/>
+              <a:t> </a:t>
+            </a:r>
+            <a:r>
+              <a:rPr lang="en-US" sz="1400" dirty="0"/>
+              <a:t>concerned with trader's reason for trading</a:t>
+            </a:r>
+            <a:r>
+              <a:rPr lang="en-US" sz="1400" dirty="0" smtClean="0"/>
+              <a:t>,</a:t>
+            </a:r>
+          </a:p>
+          <a:p>
+            <a:pPr>
+              <a:lnSpc>
+                <a:spcPct val="80000"/>
+              </a:lnSpc>
+              <a:buFont typeface="Wingdings" charset="0"/>
+              <a:buChar char=" "/>
+            </a:pPr>
+            <a:r>
+              <a:rPr lang="en-US" sz="1400" dirty="0"/>
+              <a:t> </a:t>
+            </a:r>
+            <a:r>
+              <a:rPr lang="en-US" sz="1400" dirty="0" smtClean="0"/>
+              <a:t>  </a:t>
+            </a:r>
+            <a:r>
+              <a:rPr lang="en-US" sz="1400" dirty="0" smtClean="0"/>
+              <a:t>  but </a:t>
+            </a:r>
+            <a:r>
+              <a:rPr lang="en-US" sz="1400" dirty="0"/>
+              <a:t>only </a:t>
+            </a:r>
+            <a:r>
+              <a:rPr lang="en-US" sz="1400" dirty="0" smtClean="0"/>
+              <a:t>the trades that have </a:t>
+            </a:r>
+            <a:r>
+              <a:rPr lang="en-US" sz="1400" dirty="0"/>
+              <a:t>occurred</a:t>
+            </a:r>
+            <a:r>
+              <a:rPr lang="en-US" sz="1600" dirty="0"/>
+              <a:t>. </a:t>
+            </a:r>
+          </a:p>
+          <a:p>
+            <a:pPr>
+              <a:lnSpc>
+                <a:spcPct val="80000"/>
               </a:lnSpc>
             </a:pPr>
-            <a:endParaRPr lang="en-US" dirty="0"/>
+            <a:endParaRPr lang="en-US" sz="1600" dirty="0"/>
           </a:p>
           <a:p>
             <a:pPr>
               <a:lnSpc>
-                <a:spcPct val="90000"/>
+                <a:spcPct val="80000"/>
               </a:lnSpc>
             </a:pPr>
             <a:r>
-              <a:rPr lang="en-US" dirty="0"/>
-              <a:t>Advantage of technical:</a:t>
-            </a:r>
+              <a:rPr lang="en-US" sz="1600" dirty="0" smtClean="0"/>
+              <a:t>Advantage:</a:t>
+            </a:r>
+            <a:endParaRPr lang="en-US" sz="1600" dirty="0"/>
           </a:p>
           <a:p>
             <a:pPr lvl="1">
               <a:lnSpc>
-                <a:spcPct val="90000"/>
+                <a:spcPct val="80000"/>
               </a:lnSpc>
             </a:pPr>
             <a:r>
-              <a:rPr lang="en-US" altLang="zh-CN" dirty="0"/>
-              <a:t>A</a:t>
-            </a:r>
-            <a:r>
-              <a:rPr lang="en-US" dirty="0"/>
-              <a:t>ctual price and volume data is observable whereas fundamental is subject to assumptions or restatements, and may not be available for all assets (i.e.. currency &amp; commodities)- </a:t>
-            </a:r>
+              <a:rPr lang="en-US" altLang="zh-CN" sz="1400" dirty="0" smtClean="0"/>
+              <a:t>The data used (a</a:t>
+            </a:r>
+            <a:r>
+              <a:rPr lang="en-US" sz="1400" dirty="0" smtClean="0"/>
+              <a:t>ctual </a:t>
+            </a:r>
+            <a:r>
+              <a:rPr lang="en-US" sz="1400" dirty="0"/>
+              <a:t>price </a:t>
+            </a:r>
+            <a:r>
+              <a:rPr lang="en-US" sz="1400" dirty="0" smtClean="0"/>
+              <a:t>&amp; volume) is </a:t>
+            </a:r>
+            <a:r>
+              <a:rPr lang="en-US" sz="1400" u="sng" dirty="0" smtClean="0"/>
+              <a:t>observable</a:t>
+            </a:r>
+            <a:r>
+              <a:rPr lang="en-US" sz="1400" dirty="0" smtClean="0"/>
+              <a:t>, </a:t>
+            </a:r>
+          </a:p>
+          <a:p>
+            <a:pPr marL="457200" lvl="1" indent="0">
+              <a:lnSpc>
+                <a:spcPct val="80000"/>
+              </a:lnSpc>
+              <a:buNone/>
+            </a:pPr>
+            <a:r>
+              <a:rPr lang="en-US" sz="1400" dirty="0" smtClean="0"/>
+              <a:t>     whereas </a:t>
+            </a:r>
+            <a:r>
+              <a:rPr lang="en-US" sz="1400" dirty="0"/>
+              <a:t>fundamental is subject to </a:t>
+            </a:r>
+            <a:r>
+              <a:rPr lang="en-US" sz="1400" dirty="0" smtClean="0"/>
+              <a:t>estimates, assumptions and restatements</a:t>
+            </a:r>
+            <a:r>
+              <a:rPr lang="en-US" sz="1400" dirty="0"/>
+              <a:t>, </a:t>
+            </a:r>
+            <a:endParaRPr lang="en-US" sz="1400" dirty="0" smtClean="0"/>
+          </a:p>
+          <a:p>
+            <a:pPr marL="457200" lvl="1" indent="0">
+              <a:lnSpc>
+                <a:spcPct val="80000"/>
+              </a:lnSpc>
+              <a:buNone/>
+            </a:pPr>
+            <a:r>
+              <a:rPr lang="en-US" sz="1400" dirty="0"/>
+              <a:t> </a:t>
+            </a:r>
+            <a:r>
+              <a:rPr lang="en-US" sz="1400" dirty="0" smtClean="0"/>
+              <a:t>                                     </a:t>
+            </a:r>
+            <a:r>
+              <a:rPr lang="en-US" sz="1400" dirty="0" smtClean="0"/>
+              <a:t>and </a:t>
+            </a:r>
+            <a:r>
+              <a:rPr lang="en-US" sz="1400" dirty="0"/>
+              <a:t>may not be </a:t>
+            </a:r>
+            <a:r>
+              <a:rPr lang="en-US" sz="1400" dirty="0" smtClean="0"/>
+              <a:t>available </a:t>
+            </a:r>
+            <a:r>
+              <a:rPr lang="en-US" sz="1400" dirty="0"/>
+              <a:t>(i.e</a:t>
+            </a:r>
+            <a:r>
+              <a:rPr lang="en-US" sz="1400" dirty="0" smtClean="0"/>
+              <a:t>. </a:t>
+            </a:r>
+            <a:r>
+              <a:rPr lang="en-US" sz="1400" dirty="0"/>
+              <a:t>currency &amp; </a:t>
+            </a:r>
+            <a:r>
+              <a:rPr lang="en-US" sz="1400" dirty="0" smtClean="0"/>
+              <a:t>commodities</a:t>
+            </a:r>
+            <a:r>
+              <a:rPr lang="en-US" sz="1400" dirty="0"/>
+              <a:t>)</a:t>
+            </a:r>
+            <a:endParaRPr lang="en-US" sz="1400" dirty="0"/>
           </a:p>
           <a:p>
             <a:pPr lvl="1">
               <a:lnSpc>
-                <a:spcPct val="90000"/>
+                <a:spcPct val="80000"/>
               </a:lnSpc>
             </a:pPr>
             <a:r>
-              <a:rPr lang="en-US" altLang="zh-CN" dirty="0"/>
+              <a:rPr lang="en-US" altLang="zh-CN" sz="1400" dirty="0"/>
               <a:t>A</a:t>
             </a:r>
             <a:r>
-              <a:rPr lang="en-US" dirty="0"/>
-              <a:t>pplied to asset prices w/o future cash flows (dividend and interest)</a:t>
+              <a:rPr lang="en-US" sz="1400" dirty="0"/>
+              <a:t>pplied to </a:t>
+            </a:r>
+            <a:r>
+              <a:rPr lang="en-US" sz="1400" dirty="0" smtClean="0"/>
+              <a:t>the assets that don’t produce </a:t>
+            </a:r>
+            <a:r>
+              <a:rPr lang="en-US" sz="1400" u="sng" dirty="0"/>
+              <a:t>future cash </a:t>
+            </a:r>
+            <a:r>
+              <a:rPr lang="en-US" sz="1400" u="sng" dirty="0" smtClean="0"/>
+              <a:t>flows</a:t>
+            </a:r>
+            <a:r>
+              <a:rPr lang="en-US" sz="1400" dirty="0" smtClean="0"/>
+              <a:t> (</a:t>
+            </a:r>
+            <a:r>
+              <a:rPr lang="en-US" sz="1400" dirty="0"/>
+              <a:t>dividend and interest)</a:t>
             </a:r>
           </a:p>
           <a:p>
             <a:pPr lvl="1">
               <a:lnSpc>
-                <a:spcPct val="90000"/>
+                <a:spcPct val="80000"/>
               </a:lnSpc>
             </a:pPr>
             <a:r>
-              <a:rPr lang="en-US" altLang="zh-CN" dirty="0"/>
+              <a:rPr lang="en-US" altLang="zh-CN" sz="1400" u="sng" dirty="0"/>
               <a:t>F</a:t>
             </a:r>
             <a:r>
-              <a:rPr lang="en-US" dirty="0"/>
+              <a:rPr lang="en-US" sz="1400" u="sng" dirty="0"/>
               <a:t>inancial statement fraud</a:t>
             </a:r>
             <a:r>
-              <a:rPr lang="en-US" altLang="zh-CN" dirty="0"/>
+              <a:rPr lang="en-US" altLang="zh-CN" sz="1400" dirty="0"/>
               <a:t>:</a:t>
             </a:r>
             <a:r>
-              <a:rPr lang="zh-CN" altLang="en-US" dirty="0"/>
+              <a:rPr lang="zh-CN" altLang="en-US" sz="1400" dirty="0"/>
               <a:t> </a:t>
             </a:r>
             <a:r>
-              <a:rPr lang="en-US" dirty="0"/>
+              <a:rPr lang="en-US" sz="1400" dirty="0"/>
               <a:t>price &amp; volume reflect the true value of the company</a:t>
             </a:r>
           </a:p>
           <a:p>
             <a:pPr lvl="1">
               <a:lnSpc>
-                <a:spcPct val="90000"/>
+                <a:spcPct val="80000"/>
               </a:lnSpc>
             </a:pPr>
-            <a:endParaRPr lang="en-US" dirty="0"/>
+            <a:endParaRPr lang="en-US" sz="1400" dirty="0"/>
           </a:p>
           <a:p>
             <a:pPr>
               <a:lnSpc>
-                <a:spcPct val="90000"/>
+                <a:spcPct val="80000"/>
               </a:lnSpc>
             </a:pPr>
             <a:r>
-              <a:rPr lang="en-US" dirty="0"/>
-              <a:t>Disadvantage</a:t>
-            </a:r>
+              <a:rPr lang="en-US" sz="1600" dirty="0" smtClean="0"/>
+              <a:t>Disadvantage:</a:t>
+            </a:r>
+            <a:endParaRPr lang="en-US" sz="1600" dirty="0"/>
           </a:p>
           <a:p>
             <a:pPr lvl="1">
               <a:lnSpc>
-                <a:spcPct val="90000"/>
+                <a:spcPct val="80000"/>
               </a:lnSpc>
             </a:pPr>
             <a:r>
-              <a:rPr lang="en-US" altLang="zh-CN" dirty="0"/>
-              <a:t>P</a:t>
-            </a:r>
-            <a:r>
-              <a:rPr lang="en-US" dirty="0"/>
-              <a:t>rice &amp; volume </a:t>
-            </a:r>
-            <a:r>
-              <a:rPr lang="en-US" altLang="zh-CN" dirty="0"/>
-              <a:t>probably</a:t>
-            </a:r>
-            <a:r>
-              <a:rPr lang="zh-CN" altLang="en-US" dirty="0"/>
+              <a:rPr lang="en-US" altLang="zh-CN" sz="1400" dirty="0" smtClean="0"/>
+              <a:t>Trading </a:t>
+            </a:r>
+            <a:r>
+              <a:rPr lang="en-US" altLang="zh-CN" sz="1400" dirty="0" smtClean="0"/>
+              <a:t>activity may be irrational</a:t>
+            </a:r>
+          </a:p>
+          <a:p>
+            <a:pPr marL="457200" lvl="1" indent="0">
+              <a:lnSpc>
+                <a:spcPct val="80000"/>
+              </a:lnSpc>
+              <a:buNone/>
+            </a:pPr>
+            <a:r>
+              <a:rPr lang="en-US" altLang="zh-CN" sz="1400" dirty="0" smtClean="0">
+                <a:latin typeface="Wingdings"/>
+                <a:ea typeface="Wingdings"/>
+                <a:cs typeface="Wingdings"/>
+                <a:sym typeface="Wingdings"/>
+              </a:rPr>
+              <a:t>  </a:t>
+            </a:r>
+            <a:r>
+              <a:rPr lang="zh-CN" altLang="en-US" sz="1400" dirty="0" smtClean="0">
+                <a:latin typeface="Wingdings"/>
+                <a:ea typeface="Wingdings"/>
+                <a:cs typeface="Wingdings"/>
+                <a:sym typeface="Wingdings"/>
+              </a:rPr>
+              <a:t></a:t>
+            </a:r>
+            <a:r>
+              <a:rPr lang="en-US" altLang="zh-CN" sz="1400" dirty="0" smtClean="0">
+                <a:sym typeface="Wingdings"/>
+              </a:rPr>
               <a:t> </a:t>
             </a:r>
             <a:r>
-              <a:rPr lang="en-US" altLang="zh-CN" dirty="0"/>
-              <a:t>doesn’t</a:t>
-            </a:r>
-            <a:r>
-              <a:rPr lang="zh-CN" altLang="en-US" dirty="0"/>
+              <a:rPr lang="en-US" altLang="zh-CN" sz="1400" dirty="0" smtClean="0"/>
+              <a:t>can’</a:t>
+            </a:r>
+            <a:r>
+              <a:rPr lang="en-US" altLang="zh-CN" sz="1400" dirty="0" smtClean="0"/>
+              <a:t>t</a:t>
+            </a:r>
+            <a:r>
+              <a:rPr lang="zh-CN" altLang="en-US" sz="1400" dirty="0" smtClean="0"/>
               <a:t> </a:t>
             </a:r>
             <a:r>
-              <a:rPr lang="en-US" dirty="0"/>
-              <a:t>reflect the true supply &amp; demand (i.e. illiquid markets and markets subject to outside manipulation)</a:t>
+              <a:rPr lang="en-US" sz="1400" dirty="0"/>
+              <a:t>reflect </a:t>
+            </a:r>
+            <a:r>
+              <a:rPr lang="en-US" sz="1400" u="sng" dirty="0"/>
+              <a:t>the true supply &amp; demand </a:t>
+            </a:r>
+            <a:r>
+              <a:rPr lang="en-US" sz="1400" u="sng" dirty="0" smtClean="0"/>
+              <a:t>relationship</a:t>
+            </a:r>
+          </a:p>
+          <a:p>
+            <a:pPr marL="457200" lvl="1" indent="0">
+              <a:lnSpc>
+                <a:spcPct val="80000"/>
+              </a:lnSpc>
+              <a:buNone/>
+            </a:pPr>
+            <a:r>
+              <a:rPr lang="en-US" sz="1400" dirty="0"/>
+              <a:t> </a:t>
+            </a:r>
+            <a:r>
+              <a:rPr lang="en-US" sz="1400" dirty="0" smtClean="0"/>
+              <a:t>          </a:t>
+            </a:r>
+            <a:r>
+              <a:rPr lang="en-US" sz="1400" dirty="0" smtClean="0"/>
+              <a:t>(</a:t>
+            </a:r>
+            <a:r>
+              <a:rPr lang="en-US" sz="1400" dirty="0"/>
+              <a:t>i.e. illiquid markets and markets subject to outside manipulation)</a:t>
             </a:r>
           </a:p>
           <a:p>
             <a:pPr>
               <a:lnSpc>
-                <a:spcPct val="90000"/>
+                <a:spcPct val="80000"/>
               </a:lnSpc>
             </a:pPr>
-            <a:endParaRPr lang="en-US" dirty="0"/>
+            <a:endParaRPr lang="en-US" sz="1600" dirty="0"/>
           </a:p>
         </p:txBody>
       </p:sp>
@@ -8725,7 +9024,6 @@
               <a:rPr lang="en-CA" altLang="en-US" sz="2300" dirty="0" smtClean="0"/>
               <a:t>gives bigger weight to more recent prices</a:t>
             </a:r>
-            <a:endParaRPr lang="en-CA" altLang="en-US" sz="2300" dirty="0" smtClean="0"/>
           </a:p>
           <a:p>
             <a:pPr lvl="0">
@@ -8868,7 +9166,7 @@
           </a:prstGeom>
           <a:noFill/>
           <a:extLst>
-            <a:ext uri="{909E8E84-426E-40DD-AFC4-6F175D3DCCD1}">
+            <a:ext uri="{909E8E84-426E-40dd-AFC4-6F175D3DCCD1}">
               <a14:hiddenFill xmlns:a14="http://schemas.microsoft.com/office/drawing/2010/main">
                 <a:solidFill>
                   <a:srgbClr val="FFFFFF"/>
@@ -8915,7 +9213,7 @@
   <p:timing>
     <p:tnLst>
       <p:par>
-        <p:cTn id="1" dur="indefinite" restart="never" nodeType="tmRoot">
+        <p:cTn xmlns:p14="http://schemas.microsoft.com/office/powerpoint/2010/main" id="1" dur="indefinite" restart="never" nodeType="tmRoot">
           <p:childTnLst>
             <p:seq concurrent="1" nextAc="seek">
               <p:cTn id="2" dur="indefinite" nodeType="mainSeq">
@@ -9974,7 +10272,7 @@
           </a:prstGeom>
           <a:noFill/>
           <a:extLst>
-            <a:ext uri="{909E8E84-426E-40DD-AFC4-6F175D3DCCD1}">
+            <a:ext uri="{909E8E84-426E-40dd-AFC4-6F175D3DCCD1}">
               <a14:hiddenFill xmlns:a14="http://schemas.microsoft.com/office/drawing/2010/main">
                 <a:solidFill>
                   <a:srgbClr val="FFFFFF"/>
@@ -10015,7 +10313,7 @@
           </a:prstGeom>
           <a:noFill/>
           <a:extLst>
-            <a:ext uri="{909E8E84-426E-40DD-AFC4-6F175D3DCCD1}">
+            <a:ext uri="{909E8E84-426E-40dd-AFC4-6F175D3DCCD1}">
               <a14:hiddenFill xmlns:a14="http://schemas.microsoft.com/office/drawing/2010/main">
                 <a:solidFill>
                   <a:srgbClr val="FFFFFF"/>
@@ -10144,7 +10442,7 @@
   <p:timing>
     <p:tnLst>
       <p:par>
-        <p:cTn id="1" dur="indefinite" restart="never" nodeType="tmRoot">
+        <p:cTn xmlns:p14="http://schemas.microsoft.com/office/powerpoint/2010/main" id="1" dur="indefinite" restart="never" nodeType="tmRoot">
           <p:childTnLst>
             <p:seq concurrent="1" nextAc="seek">
               <p:cTn id="2" dur="indefinite" nodeType="mainSeq">
@@ -10638,7 +10936,6 @@
               <a:rPr lang="en-CA" altLang="en-US" sz="1800" dirty="0"/>
               <a:t>moving averages to define the overall trend and then use RSI to define overbought or oversold levels.</a:t>
             </a:r>
-            <a:endParaRPr lang="en-CA" altLang="en-US" sz="1800" dirty="0"/>
           </a:p>
           <a:p>
             <a:pPr lvl="1"/>
@@ -10675,7 +10972,7 @@
   <p:timing>
     <p:tnLst>
       <p:par>
-        <p:cTn id="1" dur="indefinite" restart="never" nodeType="tmRoot">
+        <p:cTn xmlns:p14="http://schemas.microsoft.com/office/powerpoint/2010/main" id="1" dur="indefinite" restart="never" nodeType="tmRoot">
           <p:childTnLst>
             <p:seq concurrent="1" nextAc="seek">
               <p:cTn id="2" dur="indefinite" nodeType="mainSeq">
@@ -11063,7 +11360,7 @@
           <a:graphicData uri="http://schemas.openxmlformats.org/presentationml/2006/ole">
             <mc:AlternateContent xmlns:mc="http://schemas.openxmlformats.org/markup-compatibility/2006">
               <mc:Choice xmlns:v="urn:schemas-microsoft-com:vml" Requires="v">
-                <p:oleObj spid="_x0000_s1050" name="Equation" r:id="rId4" imgW="3708360" imgH="914400" progId="">
+                <p:oleObj spid="_x0000_s1055" name="Equation" r:id="rId4" imgW="3708360" imgH="914400" progId="">
                   <p:embed/>
                 </p:oleObj>
               </mc:Choice>
@@ -11102,7 +11399,7 @@
                       <a:noFill/>
                       <a:extLst>
                         <a:ext uri="{909E8E84-426E-40dd-AFC4-6F175D3DCCD1}">
-                          <a14:hiddenFill xmlns="" xmlns:a14="http://schemas.microsoft.com/office/drawing/2010/main">
+                          <a14:hiddenFill xmlns:a14="http://schemas.microsoft.com/office/drawing/2010/main">
                             <a:solidFill>
                               <a:srgbClr val="FFFFFF"/>
                             </a:solidFill>
@@ -11545,7 +11842,7 @@
   <a:extraClrSchemeLst/>
   <a:extLst>
     <a:ext uri="{05A4C25C-085E-4340-85A3-A5531E510DB2}">
-      <thm15:themeFamily xmlns:thm15="http://schemas.microsoft.com/office/thememl/2012/main" name="Facet" id="{C0C680CD-088A-49FC-A102-D699147F32B2}" vid="{CFBC31BA-B70F-4F30-BCAA-4F3011E16C4D}"/>
+      <thm15:themeFamily xmlns:thm15="http://schemas.microsoft.com/office/thememl/2012/main" xmlns="" name="Facet" id="{C0C680CD-088A-49FC-A102-D699147F32B2}" vid="{CFBC31BA-B70F-4F30-BCAA-4F3011E16C4D}"/>
     </a:ext>
   </a:extLst>
 </a:theme>
@@ -11840,7 +12137,7 @@
   <a:extraClrSchemeLst/>
   <a:extLst>
     <a:ext uri="{05A4C25C-085E-4340-85A3-A5531E510DB2}">
-      <thm15:themeFamily xmlns:thm15="http://schemas.microsoft.com/office/thememl/2012/main" name="Office Theme" id="{62F939B6-93AF-4DB8-9C6B-D6C7DFDC589F}" vid="{4A3C46E8-61CC-4603-A589-7422A47A8E4A}"/>
+      <thm15:themeFamily xmlns:thm15="http://schemas.microsoft.com/office/thememl/2012/main" xmlns="" name="Office Theme" id="{62F939B6-93AF-4DB8-9C6B-D6C7DFDC589F}" vid="{4A3C46E8-61CC-4603-A589-7422A47A8E4A}"/>
     </a:ext>
   </a:extLst>
 </a:theme>

</xml_diff>